<commit_message>
Updates for Israel Training
</commit_message>
<xml_diff>
--- a/slides/Intro to Multicore Navigator.pptx
+++ b/slides/Intro to Multicore Navigator.pptx
@@ -499,7 +499,7 @@
             <a:pPr>
               <a:defRPr/>
             </a:pPr>
-            <a:fld id="{6B2782ED-576A-4C26-AB9C-FA464F1F2092}" type="slidenum">
+            <a:fld id="{F2086891-CAB8-4536-A89A-14CB86540D0B}" type="slidenum">
               <a:rPr lang="en-US"/>
               <a:pPr>
                 <a:defRPr/>
@@ -706,7 +706,7 @@
             <a:pPr>
               <a:defRPr/>
             </a:pPr>
-            <a:fld id="{6B2782ED-576A-4C26-AB9C-FA464F1F2092}" type="slidenum">
+            <a:fld id="{F2086891-CAB8-4536-A89A-14CB86540D0B}" type="slidenum">
               <a:rPr lang="en-US" smtClean="0"/>
               <a:pPr>
                 <a:defRPr/>
@@ -793,7 +793,7 @@
             <a:pPr>
               <a:defRPr/>
             </a:pPr>
-            <a:fld id="{6B2782ED-576A-4C26-AB9C-FA464F1F2092}" type="slidenum">
+            <a:fld id="{F2086891-CAB8-4536-A89A-14CB86540D0B}" type="slidenum">
               <a:rPr lang="en-US" smtClean="0"/>
               <a:pPr>
                 <a:defRPr/>
@@ -1006,7 +1006,7 @@
             <a:pPr>
               <a:defRPr/>
             </a:pPr>
-            <a:fld id="{6B2782ED-576A-4C26-AB9C-FA464F1F2092}" type="slidenum">
+            <a:fld id="{F2086891-CAB8-4536-A89A-14CB86540D0B}" type="slidenum">
               <a:rPr lang="en-US" smtClean="0"/>
               <a:pPr>
                 <a:defRPr/>
@@ -1093,7 +1093,7 @@
             <a:pPr>
               <a:defRPr/>
             </a:pPr>
-            <a:fld id="{6B2782ED-576A-4C26-AB9C-FA464F1F2092}" type="slidenum">
+            <a:fld id="{F2086891-CAB8-4536-A89A-14CB86540D0B}" type="slidenum">
               <a:rPr lang="en-US" smtClean="0"/>
               <a:pPr>
                 <a:defRPr/>
@@ -1185,7 +1185,7 @@
           <a:bodyPr/>
           <a:lstStyle/>
           <a:p>
-            <a:fld id="{66ACF9D3-0DE6-40EB-85DF-C0E6CCAA59B7}" type="slidenum">
+            <a:fld id="{507DE491-F069-48FB-AA52-612349ECD795}" type="slidenum">
               <a:rPr lang="en-US" smtClean="0">
                 <a:latin typeface="Arial" charset="0"/>
               </a:rPr>
@@ -1281,7 +1281,7 @@
           <a:bodyPr/>
           <a:lstStyle/>
           <a:p>
-            <a:fld id="{D3162B26-377D-4695-99B3-F3902C4ADB0D}" type="slidenum">
+            <a:fld id="{C96AACEE-6892-4414-AE37-FEBB945F2DCB}" type="slidenum">
               <a:rPr lang="en-US" smtClean="0">
                 <a:latin typeface="Arial" charset="0"/>
               </a:rPr>
@@ -1370,7 +1370,7 @@
             <a:pPr>
               <a:defRPr/>
             </a:pPr>
-            <a:fld id="{6B2782ED-576A-4C26-AB9C-FA464F1F2092}" type="slidenum">
+            <a:fld id="{F2086891-CAB8-4536-A89A-14CB86540D0B}" type="slidenum">
               <a:rPr lang="en-US" smtClean="0"/>
               <a:pPr>
                 <a:defRPr/>
@@ -1457,7 +1457,7 @@
             <a:pPr>
               <a:defRPr/>
             </a:pPr>
-            <a:fld id="{6B2782ED-576A-4C26-AB9C-FA464F1F2092}" type="slidenum">
+            <a:fld id="{F2086891-CAB8-4536-A89A-14CB86540D0B}" type="slidenum">
               <a:rPr lang="en-US" smtClean="0"/>
               <a:pPr>
                 <a:defRPr/>
@@ -1544,7 +1544,7 @@
             <a:pPr>
               <a:defRPr/>
             </a:pPr>
-            <a:fld id="{6B2782ED-576A-4C26-AB9C-FA464F1F2092}" type="slidenum">
+            <a:fld id="{F2086891-CAB8-4536-A89A-14CB86540D0B}" type="slidenum">
               <a:rPr lang="en-US" smtClean="0"/>
               <a:pPr>
                 <a:defRPr/>
@@ -1631,7 +1631,7 @@
             <a:pPr>
               <a:defRPr/>
             </a:pPr>
-            <a:fld id="{6B2782ED-576A-4C26-AB9C-FA464F1F2092}" type="slidenum">
+            <a:fld id="{F2086891-CAB8-4536-A89A-14CB86540D0B}" type="slidenum">
               <a:rPr lang="en-US" smtClean="0"/>
               <a:pPr>
                 <a:defRPr/>
@@ -1718,7 +1718,7 @@
             <a:pPr>
               <a:defRPr/>
             </a:pPr>
-            <a:fld id="{6B2782ED-576A-4C26-AB9C-FA464F1F2092}" type="slidenum">
+            <a:fld id="{F2086891-CAB8-4536-A89A-14CB86540D0B}" type="slidenum">
               <a:rPr lang="en-US" smtClean="0"/>
               <a:pPr>
                 <a:defRPr/>
@@ -1810,7 +1810,7 @@
           <a:bodyPr/>
           <a:lstStyle/>
           <a:p>
-            <a:fld id="{40B3FF3B-B50E-4E0C-959E-1FFF0C99C001}" type="slidenum">
+            <a:fld id="{39EC303D-612D-4DA7-BA46-8954C1BBB448}" type="slidenum">
               <a:rPr lang="en-US" smtClean="0">
                 <a:latin typeface="Arial" charset="0"/>
               </a:rPr>
@@ -1904,7 +1904,7 @@
           <a:bodyPr/>
           <a:lstStyle/>
           <a:p>
-            <a:fld id="{41C1B430-FF9C-47B4-AC13-684EDAB03EC4}" type="slidenum">
+            <a:fld id="{6C5B4C1E-1B6D-4963-A48F-EC05EDB0AD4C}" type="slidenum">
               <a:rPr lang="en-US" smtClean="0">
                 <a:latin typeface="Arial" charset="0"/>
               </a:rPr>
@@ -1993,7 +1993,7 @@
             <a:pPr>
               <a:defRPr/>
             </a:pPr>
-            <a:fld id="{6B2782ED-576A-4C26-AB9C-FA464F1F2092}" type="slidenum">
+            <a:fld id="{F2086891-CAB8-4536-A89A-14CB86540D0B}" type="slidenum">
               <a:rPr lang="en-US" smtClean="0"/>
               <a:pPr>
                 <a:defRPr/>
@@ -2080,7 +2080,7 @@
             <a:pPr>
               <a:defRPr/>
             </a:pPr>
-            <a:fld id="{6B2782ED-576A-4C26-AB9C-FA464F1F2092}" type="slidenum">
+            <a:fld id="{F2086891-CAB8-4536-A89A-14CB86540D0B}" type="slidenum">
               <a:rPr lang="en-US" smtClean="0"/>
               <a:pPr>
                 <a:defRPr/>
@@ -2167,7 +2167,7 @@
             <a:pPr>
               <a:defRPr/>
             </a:pPr>
-            <a:fld id="{6B2782ED-576A-4C26-AB9C-FA464F1F2092}" type="slidenum">
+            <a:fld id="{F2086891-CAB8-4536-A89A-14CB86540D0B}" type="slidenum">
               <a:rPr lang="en-US" smtClean="0"/>
               <a:pPr>
                 <a:defRPr/>
@@ -2254,7 +2254,7 @@
             <a:pPr>
               <a:defRPr/>
             </a:pPr>
-            <a:fld id="{6B2782ED-576A-4C26-AB9C-FA464F1F2092}" type="slidenum">
+            <a:fld id="{F2086891-CAB8-4536-A89A-14CB86540D0B}" type="slidenum">
               <a:rPr lang="en-US" smtClean="0"/>
               <a:pPr>
                 <a:defRPr/>
@@ -2534,7 +2534,7 @@
           <a:bodyPr/>
           <a:lstStyle/>
           <a:p>
-            <a:fld id="{2065B78A-9517-4FB0-8FA0-08A317401A42}" type="slidenum">
+            <a:fld id="{72E89829-321C-401B-82FE-9CDBC8505B65}" type="slidenum">
               <a:rPr lang="en-US" smtClean="0">
                 <a:latin typeface="Arial" charset="0"/>
               </a:rPr>
@@ -2812,7 +2812,7 @@
             <a:pPr>
               <a:defRPr/>
             </a:pPr>
-            <a:fld id="{6B2782ED-576A-4C26-AB9C-FA464F1F2092}" type="slidenum">
+            <a:fld id="{F2086891-CAB8-4536-A89A-14CB86540D0B}" type="slidenum">
               <a:rPr lang="en-US" smtClean="0"/>
               <a:pPr>
                 <a:defRPr/>
@@ -2899,7 +2899,7 @@
             <a:pPr>
               <a:defRPr/>
             </a:pPr>
-            <a:fld id="{6B2782ED-576A-4C26-AB9C-FA464F1F2092}" type="slidenum">
+            <a:fld id="{F2086891-CAB8-4536-A89A-14CB86540D0B}" type="slidenum">
               <a:rPr lang="en-US" smtClean="0"/>
               <a:pPr>
                 <a:defRPr/>
@@ -2986,7 +2986,7 @@
             <a:pPr>
               <a:defRPr/>
             </a:pPr>
-            <a:fld id="{6B2782ED-576A-4C26-AB9C-FA464F1F2092}" type="slidenum">
+            <a:fld id="{F2086891-CAB8-4536-A89A-14CB86540D0B}" type="slidenum">
               <a:rPr lang="en-US" smtClean="0"/>
               <a:pPr>
                 <a:defRPr/>
@@ -3073,7 +3073,7 @@
             <a:pPr>
               <a:defRPr/>
             </a:pPr>
-            <a:fld id="{6B2782ED-576A-4C26-AB9C-FA464F1F2092}" type="slidenum">
+            <a:fld id="{F2086891-CAB8-4536-A89A-14CB86540D0B}" type="slidenum">
               <a:rPr lang="en-US" smtClean="0"/>
               <a:pPr>
                 <a:defRPr/>
@@ -3160,7 +3160,7 @@
             <a:pPr>
               <a:defRPr/>
             </a:pPr>
-            <a:fld id="{6B2782ED-576A-4C26-AB9C-FA464F1F2092}" type="slidenum">
+            <a:fld id="{F2086891-CAB8-4536-A89A-14CB86540D0B}" type="slidenum">
               <a:rPr lang="en-US" smtClean="0"/>
               <a:pPr>
                 <a:defRPr/>
@@ -3247,7 +3247,7 @@
             <a:pPr>
               <a:defRPr/>
             </a:pPr>
-            <a:fld id="{6B2782ED-576A-4C26-AB9C-FA464F1F2092}" type="slidenum">
+            <a:fld id="{F2086891-CAB8-4536-A89A-14CB86540D0B}" type="slidenum">
               <a:rPr lang="en-US" smtClean="0"/>
               <a:pPr>
                 <a:defRPr/>
@@ -3334,7 +3334,7 @@
             <a:pPr>
               <a:defRPr/>
             </a:pPr>
-            <a:fld id="{6B2782ED-576A-4C26-AB9C-FA464F1F2092}" type="slidenum">
+            <a:fld id="{F2086891-CAB8-4536-A89A-14CB86540D0B}" type="slidenum">
               <a:rPr lang="en-US" smtClean="0"/>
               <a:pPr>
                 <a:defRPr/>
@@ -3421,7 +3421,7 @@
             <a:pPr>
               <a:defRPr/>
             </a:pPr>
-            <a:fld id="{6B2782ED-576A-4C26-AB9C-FA464F1F2092}" type="slidenum">
+            <a:fld id="{F2086891-CAB8-4536-A89A-14CB86540D0B}" type="slidenum">
               <a:rPr lang="en-US" smtClean="0"/>
               <a:pPr>
                 <a:defRPr/>
@@ -3508,7 +3508,7 @@
             <a:pPr>
               <a:defRPr/>
             </a:pPr>
-            <a:fld id="{6B2782ED-576A-4C26-AB9C-FA464F1F2092}" type="slidenum">
+            <a:fld id="{F2086891-CAB8-4536-A89A-14CB86540D0B}" type="slidenum">
               <a:rPr lang="en-US" smtClean="0"/>
               <a:pPr>
                 <a:defRPr/>
@@ -3595,7 +3595,7 @@
             <a:pPr>
               <a:defRPr/>
             </a:pPr>
-            <a:fld id="{6B2782ED-576A-4C26-AB9C-FA464F1F2092}" type="slidenum">
+            <a:fld id="{F2086891-CAB8-4536-A89A-14CB86540D0B}" type="slidenum">
               <a:rPr lang="en-US" smtClean="0"/>
               <a:pPr>
                 <a:defRPr/>
@@ -3648,7 +3648,7 @@
           <a:bodyPr/>
           <a:lstStyle/>
           <a:p>
-            <a:fld id="{806C4099-65B6-4655-800C-A204C5EBC85B}" type="slidenum">
+            <a:fld id="{72419F1B-641B-4DB9-8D4F-19B519902C28}" type="slidenum">
               <a:rPr lang="en-US" smtClean="0">
                 <a:latin typeface="Arial" charset="0"/>
               </a:rPr>
@@ -3746,7 +3746,7 @@
           <a:bodyPr/>
           <a:lstStyle/>
           <a:p>
-            <a:fld id="{0126B9BE-DB37-4A8A-941F-22A545796F6D}" type="slidenum">
+            <a:fld id="{0C5001A3-575F-41DF-A741-EE43D57EA8EA}" type="slidenum">
               <a:rPr lang="en-US" smtClean="0">
                 <a:latin typeface="Arial" charset="0"/>
               </a:rPr>
@@ -3878,7 +3878,7 @@
             <a:pPr>
               <a:defRPr/>
             </a:pPr>
-            <a:fld id="{6B2782ED-576A-4C26-AB9C-FA464F1F2092}" type="slidenum">
+            <a:fld id="{F2086891-CAB8-4536-A89A-14CB86540D0B}" type="slidenum">
               <a:rPr lang="en-US" smtClean="0"/>
               <a:pPr>
                 <a:defRPr/>
@@ -3965,7 +3965,7 @@
             <a:pPr>
               <a:defRPr/>
             </a:pPr>
-            <a:fld id="{6B2782ED-576A-4C26-AB9C-FA464F1F2092}" type="slidenum">
+            <a:fld id="{F2086891-CAB8-4536-A89A-14CB86540D0B}" type="slidenum">
               <a:rPr lang="en-US" smtClean="0"/>
               <a:pPr>
                 <a:defRPr/>
@@ -4052,7 +4052,7 @@
             <a:pPr>
               <a:defRPr/>
             </a:pPr>
-            <a:fld id="{6B2782ED-576A-4C26-AB9C-FA464F1F2092}" type="slidenum">
+            <a:fld id="{F2086891-CAB8-4536-A89A-14CB86540D0B}" type="slidenum">
               <a:rPr lang="en-US" smtClean="0"/>
               <a:pPr>
                 <a:defRPr/>
@@ -4139,7 +4139,7 @@
             <a:pPr>
               <a:defRPr/>
             </a:pPr>
-            <a:fld id="{6B2782ED-576A-4C26-AB9C-FA464F1F2092}" type="slidenum">
+            <a:fld id="{F2086891-CAB8-4536-A89A-14CB86540D0B}" type="slidenum">
               <a:rPr lang="en-US" smtClean="0"/>
               <a:pPr>
                 <a:defRPr/>
@@ -4226,7 +4226,7 @@
             <a:pPr>
               <a:defRPr/>
             </a:pPr>
-            <a:fld id="{6B2782ED-576A-4C26-AB9C-FA464F1F2092}" type="slidenum">
+            <a:fld id="{F2086891-CAB8-4536-A89A-14CB86540D0B}" type="slidenum">
               <a:rPr lang="en-US" smtClean="0"/>
               <a:pPr>
                 <a:defRPr/>
@@ -4313,7 +4313,7 @@
             <a:pPr>
               <a:defRPr/>
             </a:pPr>
-            <a:fld id="{6B2782ED-576A-4C26-AB9C-FA464F1F2092}" type="slidenum">
+            <a:fld id="{F2086891-CAB8-4536-A89A-14CB86540D0B}" type="slidenum">
               <a:rPr lang="en-US" smtClean="0"/>
               <a:pPr>
                 <a:defRPr/>
@@ -14397,7 +14397,7 @@
           <a:bodyPr/>
           <a:lstStyle/>
           <a:p>
-            <a:fld id="{B0AEDE00-0461-43DE-B688-4389520B74A7}" type="slidenum">
+            <a:fld id="{784A1594-E926-4F51-BE44-6397B5AB7182}" type="slidenum">
               <a:rPr lang="en-US"/>
               <a:pPr/>
               <a:t>42</a:t>
@@ -14631,7 +14631,7 @@
           <a:bodyPr/>
           <a:lstStyle/>
           <a:p>
-            <a:fld id="{D62CBF34-D977-49AD-B252-D188EFEAD909}" type="slidenum">
+            <a:fld id="{9F2BA5F7-23F2-4BCE-BEC3-55452EFE40DC}" type="slidenum">
               <a:rPr lang="en-US"/>
               <a:pPr/>
               <a:t>43</a:t>
@@ -21154,7 +21154,7 @@
 </file>
 
 <file path=customXml/itemProps3.xml><?xml version="1.0" encoding="utf-8"?>
-<ds:datastoreItem xmlns:ds="http://schemas.openxmlformats.org/officeDocument/2006/customXml" ds:itemID="{20464EE8-13C9-401D-B7DB-F689C5AFC7DF}">
+<ds:datastoreItem xmlns:ds="http://schemas.openxmlformats.org/officeDocument/2006/customXml" ds:itemID="{D18B2675-1F45-4BE7-8189-2C73D7253E67}">
   <ds:schemaRefs>
     <ds:schemaRef ds:uri="http://schemas.microsoft.com/office/2006/metadata/properties"/>
   </ds:schemaRefs>

</xml_diff>

<commit_message>
Fixed issue with slideshow bring presented with scrollbar.
</commit_message>
<xml_diff>
--- a/slides/Intro to Multicore Navigator.pptx
+++ b/slides/Intro to Multicore Navigator.pptx
@@ -43825,6 +43825,14 @@
 </file>
 
 <file path=customXml/item1.xml><?xml version="1.0" encoding="utf-8"?>
+<p:properties xmlns:p="http://schemas.microsoft.com/office/2006/metadata/properties" xmlns:xsi="http://www.w3.org/2001/XMLSchema-instance">
+  <documentManagement>
+    <Content_x0020_Owner xmlns="99c847d8-566e-43ce-87b7-3c417d164c47">Dave Woodall</Content_x0020_Owner>
+  </documentManagement>
+</p:properties>
+</file>
+
+<file path=customXml/item2.xml><?xml version="1.0" encoding="utf-8"?>
 <ct:contentTypeSchema xmlns:ct="http://schemas.microsoft.com/office/2006/metadata/contentType" xmlns:ma="http://schemas.microsoft.com/office/2006/metadata/properties/metaAttributes" ct:_="" ma:_="" ma:contentTypeName="Document" ma:contentTypeID="0x0101006BF34EDD2AB14F49969AD5B68D65D28C" ma:contentTypeVersion="1" ma:contentTypeDescription="Create a new document." ma:contentTypeScope="" ma:versionID="aec3fda75a9471671297bbb4606d1d91">
   <xsd:schema xmlns:xsd="http://www.w3.org/2001/XMLSchema" xmlns:p="http://schemas.microsoft.com/office/2006/metadata/properties" xmlns:ns2="99c847d8-566e-43ce-87b7-3c417d164c47" targetNamespace="http://schemas.microsoft.com/office/2006/metadata/properties" ma:root="true" ma:fieldsID="6b49c4b1e87cfd71c9528e3cb8636bc2" ns2:_="">
     <xsd:import namespace="99c847d8-566e-43ce-87b7-3c417d164c47"/>
@@ -43886,14 +43894,6 @@
 </ct:contentTypeSchema>
 </file>
 
-<file path=customXml/item2.xml><?xml version="1.0" encoding="utf-8"?>
-<p:properties xmlns:p="http://schemas.microsoft.com/office/2006/metadata/properties" xmlns:xsi="http://www.w3.org/2001/XMLSchema-instance">
-  <documentManagement>
-    <Content_x0020_Owner xmlns="99c847d8-566e-43ce-87b7-3c417d164c47">Dave Woodall</Content_x0020_Owner>
-  </documentManagement>
-</p:properties>
-</file>
-
 <file path=customXml/item3.xml><?xml version="1.0" encoding="utf-8"?>
 <?mso-contentType ?>
 <FormTemplates xmlns="http://schemas.microsoft.com/sharepoint/v3/contenttype/forms">
@@ -43904,6 +43904,15 @@
 </file>
 
 <file path=customXml/itemProps1.xml><?xml version="1.0" encoding="utf-8"?>
+<ds:datastoreItem xmlns:ds="http://schemas.openxmlformats.org/officeDocument/2006/customXml" ds:itemID="{EFA0F515-20D6-4FFD-AA18-3A8F050DC35F}">
+  <ds:schemaRefs>
+    <ds:schemaRef ds:uri="http://schemas.microsoft.com/office/2006/metadata/properties"/>
+    <ds:schemaRef ds:uri="99c847d8-566e-43ce-87b7-3c417d164c47"/>
+  </ds:schemaRefs>
+</ds:datastoreItem>
+</file>
+
+<file path=customXml/itemProps2.xml><?xml version="1.0" encoding="utf-8"?>
 <ds:datastoreItem xmlns:ds="http://schemas.openxmlformats.org/officeDocument/2006/customXml" ds:itemID="{557188FD-3D88-4CDB-A1CD-FD90E93E7744}">
   <ds:schemaRefs>
     <ds:schemaRef ds:uri="http://schemas.microsoft.com/office/2006/metadata/contentType"/>
@@ -43920,15 +43929,6 @@
 </ds:datastoreItem>
 </file>
 
-<file path=customXml/itemProps2.xml><?xml version="1.0" encoding="utf-8"?>
-<ds:datastoreItem xmlns:ds="http://schemas.openxmlformats.org/officeDocument/2006/customXml" ds:itemID="{EFA0F515-20D6-4FFD-AA18-3A8F050DC35F}">
-  <ds:schemaRefs>
-    <ds:schemaRef ds:uri="http://schemas.microsoft.com/office/2006/metadata/properties"/>
-    <ds:schemaRef ds:uri="99c847d8-566e-43ce-87b7-3c417d164c47"/>
-  </ds:schemaRefs>
-</ds:datastoreItem>
-</file>
-
 <file path=customXml/itemProps3.xml><?xml version="1.0" encoding="utf-8"?>
 <ds:datastoreItem xmlns:ds="http://schemas.openxmlformats.org/officeDocument/2006/customXml" ds:itemID="{39C2D05C-3725-4078-A67D-3B4972D05610}">
   <ds:schemaRefs>

</xml_diff>